<commit_message>
revision 10, submitted to PRL
</commit_message>
<xml_diff>
--- a/suppl_images/f-factor.pptx
+++ b/suppl_images/f-factor.pptx
@@ -288,7 +288,7 @@
           <a:p>
             <a:fld id="{9858CED1-37E9-499D-9367-09BDEA9727D8}" type="datetimeFigureOut">
               <a:rPr lang="en-US" smtClean="0"/>
-              <a:t>7/19/2013</a:t>
+              <a:t>7/22/2013</a:t>
             </a:fld>
             <a:endParaRPr lang="en-US"/>
           </a:p>
@@ -458,7 +458,7 @@
           <a:p>
             <a:fld id="{9858CED1-37E9-499D-9367-09BDEA9727D8}" type="datetimeFigureOut">
               <a:rPr lang="en-US" smtClean="0"/>
-              <a:t>7/19/2013</a:t>
+              <a:t>7/22/2013</a:t>
             </a:fld>
             <a:endParaRPr lang="en-US"/>
           </a:p>
@@ -638,7 +638,7 @@
           <a:p>
             <a:fld id="{9858CED1-37E9-499D-9367-09BDEA9727D8}" type="datetimeFigureOut">
               <a:rPr lang="en-US" smtClean="0"/>
-              <a:t>7/19/2013</a:t>
+              <a:t>7/22/2013</a:t>
             </a:fld>
             <a:endParaRPr lang="en-US"/>
           </a:p>
@@ -808,7 +808,7 @@
           <a:p>
             <a:fld id="{9858CED1-37E9-499D-9367-09BDEA9727D8}" type="datetimeFigureOut">
               <a:rPr lang="en-US" smtClean="0"/>
-              <a:t>7/19/2013</a:t>
+              <a:t>7/22/2013</a:t>
             </a:fld>
             <a:endParaRPr lang="en-US"/>
           </a:p>
@@ -1054,7 +1054,7 @@
           <a:p>
             <a:fld id="{9858CED1-37E9-499D-9367-09BDEA9727D8}" type="datetimeFigureOut">
               <a:rPr lang="en-US" smtClean="0"/>
-              <a:t>7/19/2013</a:t>
+              <a:t>7/22/2013</a:t>
             </a:fld>
             <a:endParaRPr lang="en-US"/>
           </a:p>
@@ -1342,7 +1342,7 @@
           <a:p>
             <a:fld id="{9858CED1-37E9-499D-9367-09BDEA9727D8}" type="datetimeFigureOut">
               <a:rPr lang="en-US" smtClean="0"/>
-              <a:t>7/19/2013</a:t>
+              <a:t>7/22/2013</a:t>
             </a:fld>
             <a:endParaRPr lang="en-US"/>
           </a:p>
@@ -1764,7 +1764,7 @@
           <a:p>
             <a:fld id="{9858CED1-37E9-499D-9367-09BDEA9727D8}" type="datetimeFigureOut">
               <a:rPr lang="en-US" smtClean="0"/>
-              <a:t>7/19/2013</a:t>
+              <a:t>7/22/2013</a:t>
             </a:fld>
             <a:endParaRPr lang="en-US"/>
           </a:p>
@@ -1882,7 +1882,7 @@
           <a:p>
             <a:fld id="{9858CED1-37E9-499D-9367-09BDEA9727D8}" type="datetimeFigureOut">
               <a:rPr lang="en-US" smtClean="0"/>
-              <a:t>7/19/2013</a:t>
+              <a:t>7/22/2013</a:t>
             </a:fld>
             <a:endParaRPr lang="en-US"/>
           </a:p>
@@ -1977,7 +1977,7 @@
           <a:p>
             <a:fld id="{9858CED1-37E9-499D-9367-09BDEA9727D8}" type="datetimeFigureOut">
               <a:rPr lang="en-US" smtClean="0"/>
-              <a:t>7/19/2013</a:t>
+              <a:t>7/22/2013</a:t>
             </a:fld>
             <a:endParaRPr lang="en-US"/>
           </a:p>
@@ -2254,7 +2254,7 @@
           <a:p>
             <a:fld id="{9858CED1-37E9-499D-9367-09BDEA9727D8}" type="datetimeFigureOut">
               <a:rPr lang="en-US" smtClean="0"/>
-              <a:t>7/19/2013</a:t>
+              <a:t>7/22/2013</a:t>
             </a:fld>
             <a:endParaRPr lang="en-US"/>
           </a:p>
@@ -2507,7 +2507,7 @@
           <a:p>
             <a:fld id="{9858CED1-37E9-499D-9367-09BDEA9727D8}" type="datetimeFigureOut">
               <a:rPr lang="en-US" smtClean="0"/>
-              <a:t>7/19/2013</a:t>
+              <a:t>7/22/2013</a:t>
             </a:fld>
             <a:endParaRPr lang="en-US"/>
           </a:p>
@@ -2720,7 +2720,7 @@
           <a:p>
             <a:fld id="{9858CED1-37E9-499D-9367-09BDEA9727D8}" type="datetimeFigureOut">
               <a:rPr lang="en-US" smtClean="0"/>
-              <a:t>7/19/2013</a:t>
+              <a:t>7/22/2013</a:t>
             </a:fld>
             <a:endParaRPr lang="en-US"/>
           </a:p>
@@ -3097,7 +3097,7 @@
       </p:grpSpPr>
       <p:pic>
         <p:nvPicPr>
-          <p:cNvPr id="1027" name="Picture 3" descr="C:\Users\Owner\research\graphene\graphene_hf\results\2009_MagnetoPhonons_121\FillingFactor-Dependence\fig9.png"/>
+          <p:cNvPr id="2" name="Picture 2" descr="C:\Users\Owner\research\graphene\graphene_hf\results\2009_MagnetoPhonons_121\FillingFactor-Dependence\fig8.png"/>
           <p:cNvPicPr>
             <a:picLocks noChangeAspect="1" noChangeArrowheads="1"/>
           </p:cNvPicPr>
@@ -3105,47 +3105,6 @@
         </p:nvPicPr>
         <p:blipFill>
           <a:blip r:embed="rId2" cstate="print">
-            <a:extLst>
-              <a:ext uri="{28A0092B-C50C-407E-A947-70E740481C1C}">
-                <a14:useLocalDpi xmlns:a14="http://schemas.microsoft.com/office/drawing/2010/main" val="0"/>
-              </a:ext>
-            </a:extLst>
-          </a:blip>
-          <a:srcRect/>
-          <a:stretch>
-            <a:fillRect/>
-          </a:stretch>
-        </p:blipFill>
-        <p:spPr bwMode="auto">
-          <a:xfrm>
-            <a:off x="4419600" y="0"/>
-            <a:ext cx="4572001" cy="3429000"/>
-          </a:xfrm>
-          <a:prstGeom prst="rect">
-            <a:avLst/>
-          </a:prstGeom>
-          <a:noFill/>
-          <a:extLst>
-            <a:ext uri="{909E8E84-426E-40DD-AFC4-6F175D3DCCD1}">
-              <a14:hiddenFill xmlns:a14="http://schemas.microsoft.com/office/drawing/2010/main">
-                <a:solidFill>
-                  <a:srgbClr val="FFFFFF"/>
-                </a:solidFill>
-              </a14:hiddenFill>
-            </a:ext>
-          </a:extLst>
-        </p:spPr>
-      </p:pic>
-      <p:pic>
-        <p:nvPicPr>
-          <p:cNvPr id="1028" name="Picture 4" descr="C:\Users\Owner\research\graphene\graphene_hf\results\2009_MagnetoPhonons_121\FillingFactor-Dependence\fig8.png"/>
-          <p:cNvPicPr>
-            <a:picLocks noChangeAspect="1" noChangeArrowheads="1"/>
-          </p:cNvPicPr>
-          <p:nvPr/>
-        </p:nvPicPr>
-        <p:blipFill>
-          <a:blip r:embed="rId3" cstate="print">
             <a:extLst>
               <a:ext uri="{28A0092B-C50C-407E-A947-70E740481C1C}">
                 <a14:useLocalDpi xmlns:a14="http://schemas.microsoft.com/office/drawing/2010/main" val="0"/>
@@ -3177,6 +3136,47 @@
           </a:extLst>
         </p:spPr>
       </p:pic>
+      <p:pic>
+        <p:nvPicPr>
+          <p:cNvPr id="3" name="Picture 3" descr="C:\Users\Owner\research\graphene\graphene_hf\results\2009_MagnetoPhonons_121\FillingFactor-Dependence\fig9.png"/>
+          <p:cNvPicPr>
+            <a:picLocks noChangeAspect="1" noChangeArrowheads="1"/>
+          </p:cNvPicPr>
+          <p:nvPr/>
+        </p:nvPicPr>
+        <p:blipFill>
+          <a:blip r:embed="rId3" cstate="print">
+            <a:extLst>
+              <a:ext uri="{28A0092B-C50C-407E-A947-70E740481C1C}">
+                <a14:useLocalDpi xmlns:a14="http://schemas.microsoft.com/office/drawing/2010/main" val="0"/>
+              </a:ext>
+            </a:extLst>
+          </a:blip>
+          <a:srcRect/>
+          <a:stretch>
+            <a:fillRect/>
+          </a:stretch>
+        </p:blipFill>
+        <p:spPr bwMode="auto">
+          <a:xfrm>
+            <a:off x="4419600" y="0"/>
+            <a:ext cx="4572000" cy="3429000"/>
+          </a:xfrm>
+          <a:prstGeom prst="rect">
+            <a:avLst/>
+          </a:prstGeom>
+          <a:noFill/>
+          <a:extLst>
+            <a:ext uri="{909E8E84-426E-40DD-AFC4-6F175D3DCCD1}">
+              <a14:hiddenFill xmlns:a14="http://schemas.microsoft.com/office/drawing/2010/main">
+                <a:solidFill>
+                  <a:srgbClr val="FFFFFF"/>
+                </a:solidFill>
+              </a14:hiddenFill>
+            </a:ext>
+          </a:extLst>
+        </p:spPr>
+      </p:pic>
       <p:sp>
         <p:nvSpPr>
           <p:cNvPr id="6" name="TextBox 5"/>
@@ -3299,7 +3299,7 @@
       </p:sp>
       <p:pic>
         <p:nvPicPr>
-          <p:cNvPr id="1030" name="Picture 6" descr="C:\Users\Owner\research\graphene\graphene_hf\results\2009_MagnetoPhonons_121\FillingFactor-Dependence\fig10.png"/>
+          <p:cNvPr id="1031" name="Picture 7" descr="C:\Users\Owner\research\graphene\graphene_hf\results\2009_MagnetoPhonons_121\FillingFactor-Dependence\fig10.png"/>
           <p:cNvPicPr>
             <a:picLocks noChangeAspect="1" noChangeArrowheads="1"/>
           </p:cNvPicPr>
@@ -3320,7 +3320,7 @@
         </p:blipFill>
         <p:spPr bwMode="auto">
           <a:xfrm>
-            <a:off x="228600" y="3429000"/>
+            <a:off x="0" y="3429000"/>
             <a:ext cx="4572000" cy="3429000"/>
           </a:xfrm>
           <a:prstGeom prst="rect">
@@ -3340,7 +3340,7 @@
       </p:pic>
       <p:pic>
         <p:nvPicPr>
-          <p:cNvPr id="1026" name="Picture 2" descr="C:\Users\Owner\research\graphene\graphene_hf\results\2009_MagnetoPhonons_121\FillingFactor-Dependence\fig11.png"/>
+          <p:cNvPr id="1032" name="Picture 8" descr="C:\Users\Owner\research\graphene\graphene_hf\results\2009_MagnetoPhonons_121\FillingFactor-Dependence\fig11.png"/>
           <p:cNvPicPr>
             <a:picLocks noChangeAspect="1" noChangeArrowheads="1"/>
           </p:cNvPicPr>
@@ -3361,8 +3361,8 @@
         </p:blipFill>
         <p:spPr bwMode="auto">
           <a:xfrm>
-            <a:off x="4648200" y="3429000"/>
-            <a:ext cx="4572001" cy="3429000"/>
+            <a:off x="4572000" y="3429000"/>
+            <a:ext cx="4572000" cy="3429000"/>
           </a:xfrm>
           <a:prstGeom prst="rect">
             <a:avLst/>

</xml_diff>